<commit_message>
Final changes to layout and such
</commit_message>
<xml_diff>
--- a/testausprosessi.pptx
+++ b/testausprosessi.pptx
@@ -104,6 +104,11 @@
       </a:defRPr>
     </a:lvl9pPr>
   </p:defaultTextStyle>
+  <p:extLst>
+    <p:ext uri="{EFAFB233-063F-42B5-8137-9DF3F51BA10A}">
+      <p15:sldGuideLst xmlns:p15="http://schemas.microsoft.com/office/powerpoint/2012/main"/>
+    </p:ext>
+  </p:extLst>
 </p:presentation>
 </file>
 
@@ -238,7 +243,7 @@
           <a:p>
             <a:fld id="{6E196FB2-18B1-448D-B5FF-14D282AF0419}" type="datetimeFigureOut">
               <a:rPr lang="fi-FI" smtClean="0"/>
-              <a:t>11.2.2018</a:t>
+              <a:t>8.4.2018</a:t>
             </a:fld>
             <a:endParaRPr lang="fi-FI"/>
           </a:p>
@@ -408,7 +413,7 @@
           <a:p>
             <a:fld id="{6E196FB2-18B1-448D-B5FF-14D282AF0419}" type="datetimeFigureOut">
               <a:rPr lang="fi-FI" smtClean="0"/>
-              <a:t>11.2.2018</a:t>
+              <a:t>8.4.2018</a:t>
             </a:fld>
             <a:endParaRPr lang="fi-FI"/>
           </a:p>
@@ -588,7 +593,7 @@
           <a:p>
             <a:fld id="{6E196FB2-18B1-448D-B5FF-14D282AF0419}" type="datetimeFigureOut">
               <a:rPr lang="fi-FI" smtClean="0"/>
-              <a:t>11.2.2018</a:t>
+              <a:t>8.4.2018</a:t>
             </a:fld>
             <a:endParaRPr lang="fi-FI"/>
           </a:p>
@@ -758,7 +763,7 @@
           <a:p>
             <a:fld id="{6E196FB2-18B1-448D-B5FF-14D282AF0419}" type="datetimeFigureOut">
               <a:rPr lang="fi-FI" smtClean="0"/>
-              <a:t>11.2.2018</a:t>
+              <a:t>8.4.2018</a:t>
             </a:fld>
             <a:endParaRPr lang="fi-FI"/>
           </a:p>
@@ -1004,7 +1009,7 @@
           <a:p>
             <a:fld id="{6E196FB2-18B1-448D-B5FF-14D282AF0419}" type="datetimeFigureOut">
               <a:rPr lang="fi-FI" smtClean="0"/>
-              <a:t>11.2.2018</a:t>
+              <a:t>8.4.2018</a:t>
             </a:fld>
             <a:endParaRPr lang="fi-FI"/>
           </a:p>
@@ -1236,7 +1241,7 @@
           <a:p>
             <a:fld id="{6E196FB2-18B1-448D-B5FF-14D282AF0419}" type="datetimeFigureOut">
               <a:rPr lang="fi-FI" smtClean="0"/>
-              <a:t>11.2.2018</a:t>
+              <a:t>8.4.2018</a:t>
             </a:fld>
             <a:endParaRPr lang="fi-FI"/>
           </a:p>
@@ -1603,7 +1608,7 @@
           <a:p>
             <a:fld id="{6E196FB2-18B1-448D-B5FF-14D282AF0419}" type="datetimeFigureOut">
               <a:rPr lang="fi-FI" smtClean="0"/>
-              <a:t>11.2.2018</a:t>
+              <a:t>8.4.2018</a:t>
             </a:fld>
             <a:endParaRPr lang="fi-FI"/>
           </a:p>
@@ -1721,7 +1726,7 @@
           <a:p>
             <a:fld id="{6E196FB2-18B1-448D-B5FF-14D282AF0419}" type="datetimeFigureOut">
               <a:rPr lang="fi-FI" smtClean="0"/>
-              <a:t>11.2.2018</a:t>
+              <a:t>8.4.2018</a:t>
             </a:fld>
             <a:endParaRPr lang="fi-FI"/>
           </a:p>
@@ -1816,7 +1821,7 @@
           <a:p>
             <a:fld id="{6E196FB2-18B1-448D-B5FF-14D282AF0419}" type="datetimeFigureOut">
               <a:rPr lang="fi-FI" smtClean="0"/>
-              <a:t>11.2.2018</a:t>
+              <a:t>8.4.2018</a:t>
             </a:fld>
             <a:endParaRPr lang="fi-FI"/>
           </a:p>
@@ -2093,7 +2098,7 @@
           <a:p>
             <a:fld id="{6E196FB2-18B1-448D-B5FF-14D282AF0419}" type="datetimeFigureOut">
               <a:rPr lang="fi-FI" smtClean="0"/>
-              <a:t>11.2.2018</a:t>
+              <a:t>8.4.2018</a:t>
             </a:fld>
             <a:endParaRPr lang="fi-FI"/>
           </a:p>
@@ -2346,7 +2351,7 @@
           <a:p>
             <a:fld id="{6E196FB2-18B1-448D-B5FF-14D282AF0419}" type="datetimeFigureOut">
               <a:rPr lang="fi-FI" smtClean="0"/>
-              <a:t>11.2.2018</a:t>
+              <a:t>8.4.2018</a:t>
             </a:fld>
             <a:endParaRPr lang="fi-FI"/>
           </a:p>
@@ -2559,7 +2564,7 @@
           <a:p>
             <a:fld id="{6E196FB2-18B1-448D-B5FF-14D282AF0419}" type="datetimeFigureOut">
               <a:rPr lang="fi-FI" smtClean="0"/>
-              <a:t>11.2.2018</a:t>
+              <a:t>8.4.2018</a:t>
             </a:fld>
             <a:endParaRPr lang="fi-FI"/>
           </a:p>
@@ -2972,7 +2977,7 @@
         </p:nvSpPr>
         <p:spPr>
           <a:xfrm>
-            <a:off x="6771928" y="3724054"/>
+            <a:off x="8233282" y="3517906"/>
             <a:ext cx="1282968" cy="552091"/>
           </a:xfrm>
           <a:prstGeom prst="roundRect">
@@ -3002,7 +3007,11 @@
             <a:pPr algn="ctr"/>
             <a:r>
               <a:rPr lang="fi-FI" sz="1100" dirty="0" smtClean="0"/>
-              <a:t>Kysymysjoukko 1. esittäminen</a:t>
+              <a:t>Kysymysjoukko 1. </a:t>
+            </a:r>
+            <a:r>
+              <a:rPr lang="fi-FI" sz="1100" dirty="0"/>
+              <a:t>vastaaminen</a:t>
             </a:r>
             <a:endParaRPr lang="fi-FI" sz="1100" dirty="0"/>
           </a:p>
@@ -3016,7 +3025,7 @@
         </p:nvSpPr>
         <p:spPr>
           <a:xfrm>
-            <a:off x="4912802" y="3769780"/>
+            <a:off x="2420703" y="3565712"/>
             <a:ext cx="1328303" cy="517056"/>
           </a:xfrm>
           <a:prstGeom prst="roundRect">
@@ -3060,8 +3069,8 @@
         </p:nvSpPr>
         <p:spPr>
           <a:xfrm>
-            <a:off x="4912802" y="4730770"/>
-            <a:ext cx="1328303" cy="735592"/>
+            <a:off x="7997787" y="4629305"/>
+            <a:ext cx="1328303" cy="633515"/>
           </a:xfrm>
           <a:prstGeom prst="roundRect">
             <a:avLst/>
@@ -3098,14 +3107,14 @@
       </p:sp>
       <p:sp>
         <p:nvSpPr>
-          <p:cNvPr id="7" name="Pyöristetty suorakulmio 6"/>
+          <p:cNvPr id="8" name="Pyöristetty suorakulmio 7"/>
           <p:cNvSpPr/>
           <p:nvPr/>
         </p:nvSpPr>
         <p:spPr>
           <a:xfrm>
-            <a:off x="109270" y="2645434"/>
-            <a:ext cx="1571482" cy="581824"/>
+            <a:off x="344943" y="2364098"/>
+            <a:ext cx="1950013" cy="550654"/>
           </a:xfrm>
           <a:prstGeom prst="roundRect">
             <a:avLst/>
@@ -3134,7 +3143,7 @@
             <a:pPr algn="ctr"/>
             <a:r>
               <a:rPr lang="fi-FI" sz="1100" dirty="0" smtClean="0"/>
-              <a:t>Tehtäväjoukkojen arpominen jokaiseen osioon</a:t>
+              <a:t>Taustakysymyslomakkeeseen vastaaminen</a:t>
             </a:r>
             <a:endParaRPr lang="fi-FI" sz="1100" dirty="0"/>
           </a:p>
@@ -3142,14 +3151,14 @@
       </p:sp>
       <p:sp>
         <p:nvSpPr>
-          <p:cNvPr id="8" name="Pyöristetty suorakulmio 7"/>
+          <p:cNvPr id="9" name="Pyöristetty suorakulmio 8"/>
           <p:cNvSpPr/>
           <p:nvPr/>
         </p:nvSpPr>
         <p:spPr>
           <a:xfrm>
-            <a:off x="2444152" y="2645434"/>
-            <a:ext cx="1950013" cy="550654"/>
+            <a:off x="2952996" y="2322403"/>
+            <a:ext cx="1468422" cy="751935"/>
           </a:xfrm>
           <a:prstGeom prst="roundRect">
             <a:avLst/>
@@ -3178,7 +3187,19 @@
             <a:pPr algn="ctr"/>
             <a:r>
               <a:rPr lang="fi-FI" sz="1100" dirty="0" smtClean="0"/>
-              <a:t>Taustakysymyslomakkeeseen vastaaminen</a:t>
+              <a:t>Maapallodemo </a:t>
+            </a:r>
+            <a:r>
+              <a:rPr lang="fi-FI" sz="1100" dirty="0" smtClean="0"/>
+              <a:t>WS</a:t>
+            </a:r>
+            <a:endParaRPr lang="fi-FI" sz="1100" dirty="0" smtClean="0"/>
+          </a:p>
+          <a:p>
+            <a:pPr algn="ctr"/>
+            <a:r>
+              <a:rPr lang="fi-FI" sz="1100" dirty="0" smtClean="0"/>
+              <a:t>Tehtäväjoukko 2.</a:t>
             </a:r>
             <a:endParaRPr lang="fi-FI" sz="1100" dirty="0"/>
           </a:p>
@@ -3186,14 +3207,14 @@
       </p:sp>
       <p:sp>
         <p:nvSpPr>
-          <p:cNvPr id="9" name="Pyöristetty suorakulmio 8"/>
+          <p:cNvPr id="10" name="Pyöristetty suorakulmio 9"/>
           <p:cNvSpPr/>
           <p:nvPr/>
         </p:nvSpPr>
         <p:spPr>
           <a:xfrm>
-            <a:off x="5052205" y="2603739"/>
-            <a:ext cx="1468422" cy="751935"/>
+            <a:off x="6710000" y="2322403"/>
+            <a:ext cx="1445558" cy="643841"/>
           </a:xfrm>
           <a:prstGeom prst="roundRect">
             <a:avLst/>
@@ -3222,14 +3243,14 @@
             <a:pPr algn="ctr"/>
             <a:r>
               <a:rPr lang="fi-FI" sz="1100" dirty="0" smtClean="0"/>
-              <a:t>Maapallodemo Desktop</a:t>
+              <a:t>Maapallodemo VR </a:t>
             </a:r>
           </a:p>
           <a:p>
             <a:pPr algn="ctr"/>
             <a:r>
               <a:rPr lang="fi-FI" sz="1100" dirty="0" smtClean="0"/>
-              <a:t>Tehtäväjoukko 2.</a:t>
+              <a:t>Tehtäväjoukko 1.</a:t>
             </a:r>
             <a:endParaRPr lang="fi-FI" sz="1100" dirty="0"/>
           </a:p>
@@ -3237,14 +3258,14 @@
       </p:sp>
       <p:sp>
         <p:nvSpPr>
-          <p:cNvPr id="10" name="Pyöristetty suorakulmio 9"/>
+          <p:cNvPr id="11" name="Pyöristetty suorakulmio 10"/>
           <p:cNvSpPr/>
           <p:nvPr/>
         </p:nvSpPr>
         <p:spPr>
           <a:xfrm>
-            <a:off x="8809209" y="2603739"/>
-            <a:ext cx="1445558" cy="643841"/>
+            <a:off x="8651569" y="2398494"/>
+            <a:ext cx="1285544" cy="552091"/>
           </a:xfrm>
           <a:prstGeom prst="roundRect">
             <a:avLst/>
@@ -3273,14 +3294,11 @@
             <a:pPr algn="ctr"/>
             <a:r>
               <a:rPr lang="fi-FI" sz="1100" dirty="0" smtClean="0"/>
-              <a:t>Maapallodemo VR </a:t>
-            </a:r>
-          </a:p>
-          <a:p>
-            <a:pPr algn="ctr"/>
-            <a:r>
-              <a:rPr lang="fi-FI" sz="1100" dirty="0" smtClean="0"/>
-              <a:t>Tehtäväjoukko 1.</a:t>
+              <a:t>Kysymysjoukko 1. </a:t>
+            </a:r>
+            <a:r>
+              <a:rPr lang="fi-FI" sz="1100" dirty="0"/>
+              <a:t>vastaaminen</a:t>
             </a:r>
             <a:endParaRPr lang="fi-FI" sz="1100" dirty="0"/>
           </a:p>
@@ -3288,14 +3306,14 @@
       </p:sp>
       <p:sp>
         <p:nvSpPr>
-          <p:cNvPr id="11" name="Pyöristetty suorakulmio 10"/>
+          <p:cNvPr id="12" name="Pyöristetty suorakulmio 11"/>
           <p:cNvSpPr/>
           <p:nvPr/>
         </p:nvSpPr>
         <p:spPr>
           <a:xfrm>
-            <a:off x="10750778" y="2679830"/>
-            <a:ext cx="1285544" cy="552091"/>
+            <a:off x="10010197" y="3553757"/>
+            <a:ext cx="1719487" cy="473279"/>
           </a:xfrm>
           <a:prstGeom prst="roundRect">
             <a:avLst/>
@@ -3324,22 +3342,21 @@
             <a:pPr algn="ctr"/>
             <a:r>
               <a:rPr lang="fi-FI" sz="1100" dirty="0" smtClean="0"/>
-              <a:t>Kysymysjoukko 1. esittäminen</a:t>
-            </a:r>
-            <a:endParaRPr lang="fi-FI" sz="1100" dirty="0"/>
-          </a:p>
-        </p:txBody>
-      </p:sp>
-      <p:sp>
-        <p:nvSpPr>
-          <p:cNvPr id="12" name="Pyöristetty suorakulmio 11"/>
+              <a:t>Pylväsdiagrammidemo VR Tehtäväjoukko 1.</a:t>
+            </a:r>
+          </a:p>
+        </p:txBody>
+      </p:sp>
+      <p:sp>
+        <p:nvSpPr>
+          <p:cNvPr id="13" name="Pyöristetty suorakulmio 12"/>
           <p:cNvSpPr/>
           <p:nvPr/>
         </p:nvSpPr>
         <p:spPr>
           <a:xfrm>
-            <a:off x="10160779" y="3749509"/>
-            <a:ext cx="1719487" cy="473279"/>
+            <a:off x="2479319" y="4709426"/>
+            <a:ext cx="1275009" cy="473279"/>
           </a:xfrm>
           <a:prstGeom prst="roundRect">
             <a:avLst/>
@@ -3367,22 +3384,39 @@
           <a:p>
             <a:pPr algn="ctr"/>
             <a:r>
+              <a:rPr lang="fi-FI" sz="1100" dirty="0" err="1" smtClean="0"/>
+              <a:t>Graafidemo</a:t>
+            </a:r>
+            <a:r>
               <a:rPr lang="fi-FI" sz="1100" dirty="0" smtClean="0"/>
-              <a:t>Pylväsdiagrammidemo VR Tehtäväjoukko 1.</a:t>
-            </a:r>
-          </a:p>
-        </p:txBody>
-      </p:sp>
-      <p:sp>
-        <p:nvSpPr>
-          <p:cNvPr id="13" name="Pyöristetty suorakulmio 12"/>
+              <a:t> </a:t>
+            </a:r>
+            <a:r>
+              <a:rPr lang="fi-FI" sz="1100" dirty="0" smtClean="0"/>
+              <a:t>WS</a:t>
+            </a:r>
+            <a:endParaRPr lang="fi-FI" sz="1100" dirty="0" smtClean="0"/>
+          </a:p>
+          <a:p>
+            <a:pPr algn="ctr"/>
+            <a:r>
+              <a:rPr lang="fi-FI" sz="1100" dirty="0" smtClean="0"/>
+              <a:t>Tehtäväjoukko 1.</a:t>
+            </a:r>
+            <a:endParaRPr lang="fi-FI" sz="1100" dirty="0"/>
+          </a:p>
+        </p:txBody>
+      </p:sp>
+      <p:sp>
+        <p:nvSpPr>
+          <p:cNvPr id="14" name="Pyöristetty suorakulmio 13"/>
           <p:cNvSpPr/>
           <p:nvPr/>
         </p:nvSpPr>
         <p:spPr>
           <a:xfrm>
-            <a:off x="8458500" y="3735252"/>
-            <a:ext cx="1275009" cy="473279"/>
+            <a:off x="4928445" y="2395010"/>
+            <a:ext cx="1285544" cy="552091"/>
           </a:xfrm>
           <a:prstGeom prst="roundRect">
             <a:avLst/>
@@ -3410,19 +3444,12 @@
           <a:p>
             <a:pPr algn="ctr"/>
             <a:r>
-              <a:rPr lang="fi-FI" sz="1100" dirty="0" err="1" smtClean="0"/>
-              <a:t>Graafidemo</a:t>
-            </a:r>
-            <a:r>
               <a:rPr lang="fi-FI" sz="1100" dirty="0" smtClean="0"/>
-              <a:t> VR</a:t>
-            </a:r>
-          </a:p>
-          <a:p>
-            <a:pPr algn="ctr"/>
+              <a:t>Kysymysjoukko 1. </a:t>
+            </a:r>
             <a:r>
               <a:rPr lang="fi-FI" sz="1100" dirty="0" smtClean="0"/>
-              <a:t>Tehtäväjoukko 1.</a:t>
+              <a:t>vastaaminen</a:t>
             </a:r>
             <a:endParaRPr lang="fi-FI" sz="1100" dirty="0"/>
           </a:p>
@@ -3430,14 +3457,14 @@
       </p:sp>
       <p:sp>
         <p:nvSpPr>
-          <p:cNvPr id="14" name="Pyöristetty suorakulmio 13"/>
+          <p:cNvPr id="20" name="Pyöristetty suorakulmio 19"/>
           <p:cNvSpPr/>
           <p:nvPr/>
         </p:nvSpPr>
         <p:spPr>
           <a:xfrm>
-            <a:off x="7027654" y="2676346"/>
-            <a:ext cx="1285544" cy="552091"/>
+            <a:off x="6126280" y="4705053"/>
+            <a:ext cx="1328303" cy="517056"/>
           </a:xfrm>
           <a:prstGeom prst="roundRect">
             <a:avLst/>
@@ -3466,7 +3493,7 @@
             <a:pPr algn="ctr"/>
             <a:r>
               <a:rPr lang="fi-FI" sz="1100" dirty="0" smtClean="0"/>
-              <a:t>Kysymysjoukko 1. esittäminen</a:t>
+              <a:t>Kysymysjoukko 2. esittäminen</a:t>
             </a:r>
             <a:endParaRPr lang="fi-FI" sz="1100" dirty="0"/>
           </a:p>
@@ -3474,14 +3501,14 @@
       </p:sp>
       <p:sp>
         <p:nvSpPr>
-          <p:cNvPr id="19" name="Pyöristetty suorakulmio 18"/>
+          <p:cNvPr id="21" name="Pyöristetty suorakulmio 20"/>
           <p:cNvSpPr/>
           <p:nvPr/>
         </p:nvSpPr>
         <p:spPr>
           <a:xfrm>
-            <a:off x="891967" y="4834233"/>
-            <a:ext cx="1285544" cy="552091"/>
+            <a:off x="5966005" y="3574028"/>
+            <a:ext cx="1795423" cy="473279"/>
           </a:xfrm>
           <a:prstGeom prst="roundRect">
             <a:avLst/>
@@ -3510,22 +3537,29 @@
             <a:pPr algn="ctr"/>
             <a:r>
               <a:rPr lang="fi-FI" sz="1100" dirty="0" smtClean="0"/>
-              <a:t>Kysymysjoukko 1. esittäminen</a:t>
-            </a:r>
-            <a:endParaRPr lang="fi-FI" sz="1100" dirty="0"/>
-          </a:p>
-        </p:txBody>
-      </p:sp>
-      <p:sp>
-        <p:nvSpPr>
-          <p:cNvPr id="20" name="Pyöristetty suorakulmio 19"/>
+              <a:t>Pylväsdiagrammidemo </a:t>
+            </a:r>
+            <a:r>
+              <a:rPr lang="fi-FI" sz="1100" dirty="0" smtClean="0"/>
+              <a:t>WS, </a:t>
+            </a:r>
+            <a:r>
+              <a:rPr lang="fi-FI" sz="1100" dirty="0" smtClean="0"/>
+              <a:t>Tehtäväjoukko 1.</a:t>
+            </a:r>
+          </a:p>
+        </p:txBody>
+      </p:sp>
+      <p:sp>
+        <p:nvSpPr>
+          <p:cNvPr id="22" name="Pyöristetty suorakulmio 21"/>
           <p:cNvSpPr/>
           <p:nvPr/>
         </p:nvSpPr>
         <p:spPr>
           <a:xfrm>
-            <a:off x="2920830" y="4840038"/>
-            <a:ext cx="1328303" cy="517056"/>
+            <a:off x="651747" y="3587602"/>
+            <a:ext cx="1275009" cy="533662"/>
           </a:xfrm>
           <a:prstGeom prst="roundRect">
             <a:avLst/>
@@ -3553,8 +3587,24 @@
           <a:p>
             <a:pPr algn="ctr"/>
             <a:r>
+              <a:rPr lang="fi-FI" sz="1100" dirty="0" err="1" smtClean="0"/>
+              <a:t>Graafidemo</a:t>
+            </a:r>
+            <a:r>
               <a:rPr lang="fi-FI" sz="1100" dirty="0" smtClean="0"/>
-              <a:t>Kysymysjoukko 2. esittäminen</a:t>
+              <a:t> </a:t>
+            </a:r>
+            <a:r>
+              <a:rPr lang="fi-FI" sz="1100" dirty="0" smtClean="0"/>
+              <a:t>VR,</a:t>
+            </a:r>
+            <a:endParaRPr lang="fi-FI" sz="1100" dirty="0" smtClean="0"/>
+          </a:p>
+          <a:p>
+            <a:pPr algn="ctr"/>
+            <a:r>
+              <a:rPr lang="fi-FI" sz="1100" dirty="0" smtClean="0"/>
+              <a:t>Tehtäväjoukko 1.</a:t>
             </a:r>
             <a:endParaRPr lang="fi-FI" sz="1100" dirty="0"/>
           </a:p>
@@ -3562,16 +3612,16 @@
       </p:sp>
       <p:sp>
         <p:nvSpPr>
-          <p:cNvPr id="21" name="Pyöristetty suorakulmio 20"/>
+          <p:cNvPr id="24" name="Nuoli oikealle 23"/>
           <p:cNvSpPr/>
           <p:nvPr/>
         </p:nvSpPr>
         <p:spPr>
           <a:xfrm>
-            <a:off x="2673177" y="3769780"/>
-            <a:ext cx="1795423" cy="473279"/>
-          </a:xfrm>
-          <a:prstGeom prst="roundRect">
+            <a:off x="2497070" y="2560706"/>
+            <a:ext cx="316523" cy="275327"/>
+          </a:xfrm>
+          <a:prstGeom prst="rightArrow">
             <a:avLst/>
           </a:prstGeom>
         </p:spPr>
@@ -3596,25 +3646,22 @@
           <a:lstStyle/>
           <a:p>
             <a:pPr algn="ctr"/>
-            <a:r>
-              <a:rPr lang="fi-FI" sz="1100" dirty="0" smtClean="0"/>
-              <a:t>Pylväsdiagrammidemo Desktop, Tehtäväjoukko 1.</a:t>
-            </a:r>
-          </a:p>
-        </p:txBody>
-      </p:sp>
-      <p:sp>
-        <p:nvSpPr>
-          <p:cNvPr id="22" name="Pyöristetty suorakulmio 21"/>
+            <a:endParaRPr lang="fi-FI"/>
+          </a:p>
+        </p:txBody>
+      </p:sp>
+      <p:sp>
+        <p:nvSpPr>
+          <p:cNvPr id="25" name="Nuoli oikealle 24"/>
           <p:cNvSpPr/>
           <p:nvPr/>
         </p:nvSpPr>
         <p:spPr>
           <a:xfrm>
-            <a:off x="888408" y="3769780"/>
-            <a:ext cx="1275009" cy="533662"/>
-          </a:xfrm>
-          <a:prstGeom prst="roundRect">
+            <a:off x="4502408" y="2560706"/>
+            <a:ext cx="316523" cy="275327"/>
+          </a:xfrm>
+          <a:prstGeom prst="rightArrow">
             <a:avLst/>
           </a:prstGeom>
         </p:spPr>
@@ -3639,34 +3686,19 @@
           <a:lstStyle/>
           <a:p>
             <a:pPr algn="ctr"/>
-            <a:r>
-              <a:rPr lang="fi-FI" sz="1100" dirty="0" err="1" smtClean="0"/>
-              <a:t>Graafidemo</a:t>
-            </a:r>
-            <a:r>
-              <a:rPr lang="fi-FI" sz="1100" dirty="0" smtClean="0"/>
-              <a:t> Desktop,</a:t>
-            </a:r>
-          </a:p>
-          <a:p>
-            <a:pPr algn="ctr"/>
-            <a:r>
-              <a:rPr lang="fi-FI" sz="1100" dirty="0" smtClean="0"/>
-              <a:t>Tehtäväjoukko 1.</a:t>
-            </a:r>
-            <a:endParaRPr lang="fi-FI" sz="1100" dirty="0"/>
-          </a:p>
-        </p:txBody>
-      </p:sp>
-      <p:sp>
-        <p:nvSpPr>
-          <p:cNvPr id="23" name="Nuoli oikealle 22"/>
+            <a:endParaRPr lang="fi-FI"/>
+          </a:p>
+        </p:txBody>
+      </p:sp>
+      <p:sp>
+        <p:nvSpPr>
+          <p:cNvPr id="26" name="Nuoli oikealle 25"/>
           <p:cNvSpPr/>
           <p:nvPr/>
         </p:nvSpPr>
         <p:spPr>
           <a:xfrm>
-            <a:off x="1925515" y="2828411"/>
+            <a:off x="6323503" y="2533391"/>
             <a:ext cx="316523" cy="275327"/>
           </a:xfrm>
           <a:prstGeom prst="rightArrow">
@@ -3700,13 +3732,13 @@
       </p:sp>
       <p:sp>
         <p:nvSpPr>
-          <p:cNvPr id="24" name="Nuoli oikealle 23"/>
+          <p:cNvPr id="27" name="Nuoli oikealle 26"/>
           <p:cNvSpPr/>
           <p:nvPr/>
         </p:nvSpPr>
         <p:spPr>
           <a:xfrm>
-            <a:off x="4596279" y="2842042"/>
+            <a:off x="8184044" y="2560706"/>
             <a:ext cx="316523" cy="275327"/>
           </a:xfrm>
           <a:prstGeom prst="rightArrow">
@@ -3740,13 +3772,13 @@
       </p:sp>
       <p:sp>
         <p:nvSpPr>
-          <p:cNvPr id="25" name="Nuoli oikealle 24"/>
+          <p:cNvPr id="28" name="Nuoli oikealle 27"/>
           <p:cNvSpPr/>
           <p:nvPr/>
         </p:nvSpPr>
         <p:spPr>
-          <a:xfrm>
-            <a:off x="6601617" y="2842042"/>
+          <a:xfrm rot="5400000">
+            <a:off x="10928650" y="3094936"/>
             <a:ext cx="316523" cy="275327"/>
           </a:xfrm>
           <a:prstGeom prst="rightArrow">
@@ -3780,13 +3812,13 @@
       </p:sp>
       <p:sp>
         <p:nvSpPr>
-          <p:cNvPr id="26" name="Nuoli oikealle 25"/>
+          <p:cNvPr id="29" name="Nuoli oikealle 28"/>
           <p:cNvSpPr/>
           <p:nvPr/>
         </p:nvSpPr>
         <p:spPr>
-          <a:xfrm>
-            <a:off x="8422712" y="2814727"/>
+          <a:xfrm rot="10800000">
+            <a:off x="9633743" y="3638475"/>
             <a:ext cx="316523" cy="275327"/>
           </a:xfrm>
           <a:prstGeom prst="rightArrow">
@@ -3820,13 +3852,13 @@
       </p:sp>
       <p:sp>
         <p:nvSpPr>
-          <p:cNvPr id="27" name="Nuoli oikealle 26"/>
+          <p:cNvPr id="31" name="Nuoli oikealle 30"/>
           <p:cNvSpPr/>
           <p:nvPr/>
         </p:nvSpPr>
         <p:spPr>
-          <a:xfrm>
-            <a:off x="10283253" y="2842042"/>
+          <a:xfrm rot="10800000">
+            <a:off x="7813206" y="3628077"/>
             <a:ext cx="316523" cy="275327"/>
           </a:xfrm>
           <a:prstGeom prst="rightArrow">
@@ -3860,13 +3892,13 @@
       </p:sp>
       <p:sp>
         <p:nvSpPr>
-          <p:cNvPr id="28" name="Nuoli oikealle 27"/>
+          <p:cNvPr id="32" name="Nuoli oikealle 31"/>
           <p:cNvSpPr/>
           <p:nvPr/>
         </p:nvSpPr>
         <p:spPr>
-          <a:xfrm rot="5400000">
-            <a:off x="11235288" y="3329439"/>
+          <a:xfrm rot="10800000">
+            <a:off x="5553983" y="3673003"/>
             <a:ext cx="316523" cy="275327"/>
           </a:xfrm>
           <a:prstGeom prst="rightArrow">
@@ -3900,13 +3932,13 @@
       </p:sp>
       <p:sp>
         <p:nvSpPr>
-          <p:cNvPr id="29" name="Nuoli oikealle 28"/>
+          <p:cNvPr id="34" name="Nuoli oikealle 33"/>
           <p:cNvSpPr/>
           <p:nvPr/>
         </p:nvSpPr>
         <p:spPr>
-          <a:xfrm rot="10800000">
-            <a:off x="9784325" y="3834227"/>
+          <a:xfrm rot="5400000">
+            <a:off x="1061716" y="4239093"/>
             <a:ext cx="316523" cy="275327"/>
           </a:xfrm>
           <a:prstGeom prst="rightArrow">
@@ -3940,13 +3972,13 @@
       </p:sp>
       <p:sp>
         <p:nvSpPr>
-          <p:cNvPr id="30" name="Nuoli oikealle 29"/>
+          <p:cNvPr id="36" name="Nuoli oikealle 35"/>
           <p:cNvSpPr/>
           <p:nvPr/>
         </p:nvSpPr>
         <p:spPr>
-          <a:xfrm rot="10800000">
-            <a:off x="8098436" y="3834226"/>
+          <a:xfrm>
+            <a:off x="3927901" y="4808401"/>
             <a:ext cx="316523" cy="275327"/>
           </a:xfrm>
           <a:prstGeom prst="rightArrow">
@@ -3980,13 +4012,13 @@
       </p:sp>
       <p:sp>
         <p:nvSpPr>
-          <p:cNvPr id="31" name="Nuoli oikealle 30"/>
+          <p:cNvPr id="37" name="Nuoli oikealle 36"/>
           <p:cNvSpPr/>
           <p:nvPr/>
         </p:nvSpPr>
         <p:spPr>
-          <a:xfrm rot="10800000">
-            <a:off x="6351852" y="3834225"/>
+          <a:xfrm>
+            <a:off x="5700411" y="4842270"/>
             <a:ext cx="316523" cy="275327"/>
           </a:xfrm>
           <a:prstGeom prst="rightArrow">
@@ -4020,16 +4052,16 @@
       </p:sp>
       <p:sp>
         <p:nvSpPr>
-          <p:cNvPr id="32" name="Nuoli oikealle 31"/>
+          <p:cNvPr id="39" name="Pyöristetty suorakulmio 38"/>
           <p:cNvSpPr/>
           <p:nvPr/>
         </p:nvSpPr>
         <p:spPr>
-          <a:xfrm rot="10800000">
-            <a:off x="4536348" y="3834225"/>
-            <a:ext cx="316523" cy="275327"/>
-          </a:xfrm>
-          <a:prstGeom prst="rightArrow">
+          <a:xfrm>
+            <a:off x="10444140" y="2395202"/>
+            <a:ext cx="1285544" cy="552091"/>
+          </a:xfrm>
+          <a:prstGeom prst="roundRect">
             <a:avLst/>
           </a:prstGeom>
         </p:spPr>
@@ -4054,19 +4086,31 @@
           <a:lstStyle/>
           <a:p>
             <a:pPr algn="ctr"/>
-            <a:endParaRPr lang="fi-FI"/>
-          </a:p>
-        </p:txBody>
-      </p:sp>
-      <p:sp>
-        <p:nvSpPr>
-          <p:cNvPr id="33" name="Nuoli oikealle 32"/>
+            <a:r>
+              <a:rPr lang="fi-FI" sz="1100" dirty="0" smtClean="0"/>
+              <a:t>Kysymysjoukko </a:t>
+            </a:r>
+            <a:r>
+              <a:rPr lang="fi-FI" sz="1100" dirty="0" smtClean="0"/>
+              <a:t>2. </a:t>
+            </a:r>
+            <a:r>
+              <a:rPr lang="fi-FI" sz="1100" dirty="0" smtClean="0"/>
+              <a:t>esittäminen</a:t>
+            </a:r>
+            <a:endParaRPr lang="fi-FI" sz="1100" dirty="0"/>
+          </a:p>
+        </p:txBody>
+      </p:sp>
+      <p:sp>
+        <p:nvSpPr>
+          <p:cNvPr id="40" name="Nuoli oikealle 39"/>
           <p:cNvSpPr/>
           <p:nvPr/>
         </p:nvSpPr>
         <p:spPr>
-          <a:xfrm rot="10800000">
-            <a:off x="2224006" y="3834224"/>
+          <a:xfrm>
+            <a:off x="9976615" y="2557414"/>
             <a:ext cx="316523" cy="275327"/>
           </a:xfrm>
           <a:prstGeom prst="rightArrow">
@@ -4100,16 +4144,16 @@
       </p:sp>
       <p:sp>
         <p:nvSpPr>
-          <p:cNvPr id="34" name="Nuoli oikealle 33"/>
+          <p:cNvPr id="41" name="Pyöristetty suorakulmio 40"/>
           <p:cNvSpPr/>
           <p:nvPr/>
         </p:nvSpPr>
         <p:spPr>
-          <a:xfrm rot="5400000">
-            <a:off x="1384827" y="4434845"/>
-            <a:ext cx="316523" cy="275327"/>
-          </a:xfrm>
-          <a:prstGeom prst="rightArrow">
+          <a:xfrm>
+            <a:off x="597277" y="4672710"/>
+            <a:ext cx="1285544" cy="552091"/>
+          </a:xfrm>
+          <a:prstGeom prst="roundRect">
             <a:avLst/>
           </a:prstGeom>
         </p:spPr>
@@ -4134,19 +4178,31 @@
           <a:lstStyle/>
           <a:p>
             <a:pPr algn="ctr"/>
-            <a:endParaRPr lang="fi-FI"/>
-          </a:p>
-        </p:txBody>
-      </p:sp>
-      <p:sp>
-        <p:nvSpPr>
-          <p:cNvPr id="36" name="Nuoli oikealle 35"/>
+            <a:r>
+              <a:rPr lang="fi-FI" sz="1100" dirty="0" smtClean="0"/>
+              <a:t>Kysymysjoukko </a:t>
+            </a:r>
+            <a:r>
+              <a:rPr lang="fi-FI" sz="1100" dirty="0" smtClean="0"/>
+              <a:t>1. </a:t>
+            </a:r>
+            <a:r>
+              <a:rPr lang="fi-FI" sz="1100" dirty="0"/>
+              <a:t>vastaaminen</a:t>
+            </a:r>
+            <a:endParaRPr lang="fi-FI" sz="1100" dirty="0"/>
+          </a:p>
+        </p:txBody>
+      </p:sp>
+      <p:sp>
+        <p:nvSpPr>
+          <p:cNvPr id="43" name="Nuoli oikealle 42"/>
           <p:cNvSpPr/>
           <p:nvPr/>
         </p:nvSpPr>
         <p:spPr>
-          <a:xfrm>
-            <a:off x="2383655" y="4973545"/>
+          <a:xfrm rot="10800000">
+            <a:off x="1998427" y="3703402"/>
             <a:ext cx="316523" cy="275327"/>
           </a:xfrm>
           <a:prstGeom prst="rightArrow">
@@ -4180,13 +4236,193 @@
       </p:sp>
       <p:sp>
         <p:nvSpPr>
-          <p:cNvPr id="37" name="Nuoli oikealle 36"/>
+          <p:cNvPr id="44" name="Pyöristetty suorakulmio 43"/>
           <p:cNvSpPr/>
           <p:nvPr/>
         </p:nvSpPr>
         <p:spPr>
           <a:xfrm>
-            <a:off x="4468600" y="4959915"/>
+            <a:off x="4297532" y="4670018"/>
+            <a:ext cx="1285544" cy="552091"/>
+          </a:xfrm>
+          <a:prstGeom prst="roundRect">
+            <a:avLst/>
+          </a:prstGeom>
+        </p:spPr>
+        <p:style>
+          <a:lnRef idx="2">
+            <a:schemeClr val="accent1">
+              <a:shade val="50000"/>
+            </a:schemeClr>
+          </a:lnRef>
+          <a:fillRef idx="1">
+            <a:schemeClr val="accent1"/>
+          </a:fillRef>
+          <a:effectRef idx="0">
+            <a:schemeClr val="accent1"/>
+          </a:effectRef>
+          <a:fontRef idx="minor">
+            <a:schemeClr val="lt1"/>
+          </a:fontRef>
+        </p:style>
+        <p:txBody>
+          <a:bodyPr rtlCol="0" anchor="ctr"/>
+          <a:lstStyle/>
+          <a:p>
+            <a:pPr algn="ctr"/>
+            <a:r>
+              <a:rPr lang="fi-FI" sz="1100" dirty="0" smtClean="0"/>
+              <a:t>Kysymysjoukko 1. </a:t>
+            </a:r>
+            <a:r>
+              <a:rPr lang="fi-FI" sz="1100" dirty="0"/>
+              <a:t>vastaaminen</a:t>
+            </a:r>
+            <a:endParaRPr lang="fi-FI" sz="1100" dirty="0"/>
+          </a:p>
+        </p:txBody>
+      </p:sp>
+      <p:sp>
+        <p:nvSpPr>
+          <p:cNvPr id="45" name="Nuoli oikealle 44"/>
+          <p:cNvSpPr/>
+          <p:nvPr/>
+        </p:nvSpPr>
+        <p:spPr>
+          <a:xfrm>
+            <a:off x="7559544" y="4824023"/>
+            <a:ext cx="316523" cy="275327"/>
+          </a:xfrm>
+          <a:prstGeom prst="rightArrow">
+            <a:avLst/>
+          </a:prstGeom>
+        </p:spPr>
+        <p:style>
+          <a:lnRef idx="2">
+            <a:schemeClr val="accent1">
+              <a:shade val="50000"/>
+            </a:schemeClr>
+          </a:lnRef>
+          <a:fillRef idx="1">
+            <a:schemeClr val="accent1"/>
+          </a:fillRef>
+          <a:effectRef idx="0">
+            <a:schemeClr val="accent1"/>
+          </a:effectRef>
+          <a:fontRef idx="minor">
+            <a:schemeClr val="lt1"/>
+          </a:fontRef>
+        </p:style>
+        <p:txBody>
+          <a:bodyPr rtlCol="0" anchor="ctr"/>
+          <a:lstStyle/>
+          <a:p>
+            <a:pPr algn="ctr"/>
+            <a:endParaRPr lang="fi-FI"/>
+          </a:p>
+        </p:txBody>
+      </p:sp>
+      <p:sp>
+        <p:nvSpPr>
+          <p:cNvPr id="46" name="Nuoli oikealle 45"/>
+          <p:cNvSpPr/>
+          <p:nvPr/>
+        </p:nvSpPr>
+        <p:spPr>
+          <a:xfrm>
+            <a:off x="2030648" y="4808398"/>
+            <a:ext cx="316523" cy="275327"/>
+          </a:xfrm>
+          <a:prstGeom prst="rightArrow">
+            <a:avLst/>
+          </a:prstGeom>
+        </p:spPr>
+        <p:style>
+          <a:lnRef idx="2">
+            <a:schemeClr val="accent1">
+              <a:shade val="50000"/>
+            </a:schemeClr>
+          </a:lnRef>
+          <a:fillRef idx="1">
+            <a:schemeClr val="accent1"/>
+          </a:fillRef>
+          <a:effectRef idx="0">
+            <a:schemeClr val="accent1"/>
+          </a:effectRef>
+          <a:fontRef idx="minor">
+            <a:schemeClr val="lt1"/>
+          </a:fontRef>
+        </p:style>
+        <p:txBody>
+          <a:bodyPr rtlCol="0" anchor="ctr"/>
+          <a:lstStyle/>
+          <a:p>
+            <a:pPr algn="ctr"/>
+            <a:endParaRPr lang="fi-FI"/>
+          </a:p>
+        </p:txBody>
+      </p:sp>
+      <p:sp>
+        <p:nvSpPr>
+          <p:cNvPr id="47" name="Pyöristetty suorakulmio 46"/>
+          <p:cNvSpPr/>
+          <p:nvPr/>
+        </p:nvSpPr>
+        <p:spPr>
+          <a:xfrm>
+            <a:off x="4186514" y="3565020"/>
+            <a:ext cx="1285544" cy="552091"/>
+          </a:xfrm>
+          <a:prstGeom prst="roundRect">
+            <a:avLst/>
+          </a:prstGeom>
+        </p:spPr>
+        <p:style>
+          <a:lnRef idx="2">
+            <a:schemeClr val="accent1">
+              <a:shade val="50000"/>
+            </a:schemeClr>
+          </a:lnRef>
+          <a:fillRef idx="1">
+            <a:schemeClr val="accent1"/>
+          </a:fillRef>
+          <a:effectRef idx="0">
+            <a:schemeClr val="accent1"/>
+          </a:effectRef>
+          <a:fontRef idx="minor">
+            <a:schemeClr val="lt1"/>
+          </a:fontRef>
+        </p:style>
+        <p:txBody>
+          <a:bodyPr rtlCol="0" anchor="ctr"/>
+          <a:lstStyle/>
+          <a:p>
+            <a:pPr algn="ctr"/>
+            <a:r>
+              <a:rPr lang="fi-FI" sz="1100" dirty="0" smtClean="0"/>
+              <a:t>Kysymysjoukko </a:t>
+            </a:r>
+            <a:r>
+              <a:rPr lang="fi-FI" sz="1100" dirty="0" smtClean="0"/>
+              <a:t>1. </a:t>
+            </a:r>
+            <a:r>
+              <a:rPr lang="fi-FI" sz="1100" dirty="0"/>
+              <a:t>vastaaminen</a:t>
+            </a:r>
+            <a:endParaRPr lang="fi-FI" sz="1100" dirty="0"/>
+          </a:p>
+        </p:txBody>
+      </p:sp>
+      <p:sp>
+        <p:nvSpPr>
+          <p:cNvPr id="48" name="Nuoli oikealle 47"/>
+          <p:cNvSpPr/>
+          <p:nvPr/>
+        </p:nvSpPr>
+        <p:spPr>
+          <a:xfrm rot="10800000">
+            <a:off x="3792326" y="3703401"/>
             <a:ext cx="316523" cy="275327"/>
           </a:xfrm>
           <a:prstGeom prst="rightArrow">

</xml_diff>